<commit_message>
reorg and more robust conversion script
</commit_message>
<xml_diff>
--- a/slides_powerpoint.pptx
+++ b/slides_powerpoint.pptx
@@ -13,6 +13,7 @@
     <p:sldId id="261" r:id="rId7"/>
     <p:sldId id="262" r:id="rId8"/>
     <p:sldId id="263" r:id="rId9"/>
+    <p:sldId id="264" r:id="rId10"/>
   </p:sldIdLst>
   <p:sldSz cx="9144000" cy="6858000" type="screen4x3"/>
   <p:notesSz cx="6858000" cy="9144000"/>
@@ -3120,7 +3121,7 @@
       </p:grpSpPr>
       <p:pic>
         <p:nvPicPr>
-          <p:cNvPr descr="slides_1.png" id="0" name="Picture 1"/>
+          <p:cNvPr descr="slides/slides_01.png" id="0" name="Picture 1"/>
           <p:cNvPicPr>
             <a:picLocks noGrp="1" noChangeAspect="1"/>
           </p:cNvPicPr>
@@ -3172,7 +3173,7 @@
       </p:grpSpPr>
       <p:pic>
         <p:nvPicPr>
-          <p:cNvPr descr="slides_2.png" id="0" name="Picture 1"/>
+          <p:cNvPr descr="slides/slides_02.png" id="0" name="Picture 1"/>
           <p:cNvPicPr>
             <a:picLocks noGrp="1" noChangeAspect="1"/>
           </p:cNvPicPr>
@@ -3224,7 +3225,7 @@
       </p:grpSpPr>
       <p:pic>
         <p:nvPicPr>
-          <p:cNvPr descr="slides_3.png" id="0" name="Picture 1"/>
+          <p:cNvPr descr="slides/slides_03.png" id="0" name="Picture 1"/>
           <p:cNvPicPr>
             <a:picLocks noGrp="1" noChangeAspect="1"/>
           </p:cNvPicPr>
@@ -3276,7 +3277,7 @@
       </p:grpSpPr>
       <p:pic>
         <p:nvPicPr>
-          <p:cNvPr descr="slides_4.png" id="0" name="Picture 1"/>
+          <p:cNvPr descr="slides/slides_04.png" id="0" name="Picture 1"/>
           <p:cNvPicPr>
             <a:picLocks noGrp="1" noChangeAspect="1"/>
           </p:cNvPicPr>
@@ -3328,7 +3329,7 @@
       </p:grpSpPr>
       <p:pic>
         <p:nvPicPr>
-          <p:cNvPr descr="slides_5.png" id="0" name="Picture 1"/>
+          <p:cNvPr descr="slides/slides_05.png" id="0" name="Picture 1"/>
           <p:cNvPicPr>
             <a:picLocks noGrp="1" noChangeAspect="1"/>
           </p:cNvPicPr>
@@ -3380,7 +3381,7 @@
       </p:grpSpPr>
       <p:pic>
         <p:nvPicPr>
-          <p:cNvPr descr="slides_6.png" id="0" name="Picture 1"/>
+          <p:cNvPr descr="slides/slides_06.png" id="0" name="Picture 1"/>
           <p:cNvPicPr>
             <a:picLocks noGrp="1" noChangeAspect="1"/>
           </p:cNvPicPr>
@@ -3432,7 +3433,7 @@
       </p:grpSpPr>
       <p:pic>
         <p:nvPicPr>
-          <p:cNvPr descr="slides_7.png" id="0" name="Picture 1"/>
+          <p:cNvPr descr="slides/slides_07.png" id="0" name="Picture 1"/>
           <p:cNvPicPr>
             <a:picLocks noGrp="1" noChangeAspect="1"/>
           </p:cNvPicPr>
@@ -3484,7 +3485,59 @@
       </p:grpSpPr>
       <p:pic>
         <p:nvPicPr>
-          <p:cNvPr descr="slides_8.png" id="0" name="Picture 1"/>
+          <p:cNvPr descr="slides/slides_08.png" id="0" name="Picture 1"/>
+          <p:cNvPicPr>
+            <a:picLocks noGrp="1" noChangeAspect="1"/>
+          </p:cNvPicPr>
+          <p:nvPr/>
+        </p:nvPicPr>
+        <p:blipFill>
+          <a:blip r:embed="rId2"/>
+          <a:stretch>
+            <a:fillRect/>
+          </a:stretch>
+        </p:blipFill>
+        <p:spPr bwMode="auto">
+          <a:xfrm>
+            <a:off x="1562100" y="1600200"/>
+            <a:ext cx="6019800" cy="4521200"/>
+          </a:xfrm>
+          <a:prstGeom prst="rect">
+            <a:avLst/>
+          </a:prstGeom>
+          <a:noFill/>
+          <a:ln w="9525">
+            <a:noFill/>
+            <a:headEnd/>
+            <a:tailEnd/>
+          </a:ln>
+        </p:spPr>
+      </p:pic>
+    </p:spTree>
+  </p:cSld>
+</p:sld>
+</file>
+
+<file path=ppt/slides/slide9.xml><?xml version="1.0" encoding="utf-8"?>
+<p:sld xmlns:a="http://schemas.openxmlformats.org/drawingml/2006/main" xmlns:r="http://schemas.openxmlformats.org/officeDocument/2006/relationships" xmlns:p="http://schemas.openxmlformats.org/presentationml/2006/main">
+  <p:cSld>
+    <p:spTree>
+      <p:nvGrpSpPr>
+        <p:cNvPr id="1" name=""/>
+        <p:cNvGrpSpPr/>
+        <p:nvPr/>
+      </p:nvGrpSpPr>
+      <p:grpSpPr>
+        <a:xfrm>
+          <a:off x="0" y="0"/>
+          <a:ext cx="0" cy="0"/>
+          <a:chOff x="0" y="0"/>
+          <a:chExt cx="0" cy="0"/>
+        </a:xfrm>
+      </p:grpSpPr>
+      <p:pic>
+        <p:nvPicPr>
+          <p:cNvPr descr="slides/slides_09.png" id="0" name="Picture 1"/>
           <p:cNvPicPr>
             <a:picLocks noGrp="1" noChangeAspect="1"/>
           </p:cNvPicPr>

</xml_diff>

<commit_message>
Remove iris to close #1
</commit_message>
<xml_diff>
--- a/slides_powerpoint.pptx
+++ b/slides_powerpoint.pptx
@@ -312,7 +312,7 @@
           <a:p>
             <a:fld id="{241EB5C9-1307-BA42-ABA2-0BC069CD8E7F}" type="datetimeFigureOut">
               <a:rPr lang="en-US" smtClean="0"/>
-              <a:t>2/17/2018</a:t>
+              <a:t>4/5/2019</a:t>
             </a:fld>
             <a:endParaRPr lang="en-US"/>
           </a:p>
@@ -482,7 +482,7 @@
           <a:p>
             <a:fld id="{241EB5C9-1307-BA42-ABA2-0BC069CD8E7F}" type="datetimeFigureOut">
               <a:rPr lang="en-US" smtClean="0"/>
-              <a:t>2/17/2018</a:t>
+              <a:t>4/5/2019</a:t>
             </a:fld>
             <a:endParaRPr lang="en-US"/>
           </a:p>
@@ -662,7 +662,7 @@
           <a:p>
             <a:fld id="{241EB5C9-1307-BA42-ABA2-0BC069CD8E7F}" type="datetimeFigureOut">
               <a:rPr lang="en-US" smtClean="0"/>
-              <a:t>2/17/2018</a:t>
+              <a:t>4/5/2019</a:t>
             </a:fld>
             <a:endParaRPr lang="en-US"/>
           </a:p>
@@ -832,7 +832,7 @@
           <a:p>
             <a:fld id="{241EB5C9-1307-BA42-ABA2-0BC069CD8E7F}" type="datetimeFigureOut">
               <a:rPr lang="en-US" smtClean="0"/>
-              <a:t>2/17/2018</a:t>
+              <a:t>4/5/2019</a:t>
             </a:fld>
             <a:endParaRPr lang="en-US"/>
           </a:p>
@@ -1078,7 +1078,7 @@
           <a:p>
             <a:fld id="{241EB5C9-1307-BA42-ABA2-0BC069CD8E7F}" type="datetimeFigureOut">
               <a:rPr lang="en-US" smtClean="0"/>
-              <a:t>2/17/2018</a:t>
+              <a:t>4/5/2019</a:t>
             </a:fld>
             <a:endParaRPr lang="en-US"/>
           </a:p>
@@ -1366,7 +1366,7 @@
           <a:p>
             <a:fld id="{241EB5C9-1307-BA42-ABA2-0BC069CD8E7F}" type="datetimeFigureOut">
               <a:rPr lang="en-US" smtClean="0"/>
-              <a:t>2/17/2018</a:t>
+              <a:t>4/5/2019</a:t>
             </a:fld>
             <a:endParaRPr lang="en-US"/>
           </a:p>
@@ -1788,7 +1788,7 @@
           <a:p>
             <a:fld id="{241EB5C9-1307-BA42-ABA2-0BC069CD8E7F}" type="datetimeFigureOut">
               <a:rPr lang="en-US" smtClean="0"/>
-              <a:t>2/17/2018</a:t>
+              <a:t>4/5/2019</a:t>
             </a:fld>
             <a:endParaRPr lang="en-US"/>
           </a:p>
@@ -1906,7 +1906,7 @@
           <a:p>
             <a:fld id="{241EB5C9-1307-BA42-ABA2-0BC069CD8E7F}" type="datetimeFigureOut">
               <a:rPr lang="en-US" smtClean="0"/>
-              <a:t>2/17/2018</a:t>
+              <a:t>4/5/2019</a:t>
             </a:fld>
             <a:endParaRPr lang="en-US"/>
           </a:p>
@@ -2001,7 +2001,7 @@
           <a:p>
             <a:fld id="{241EB5C9-1307-BA42-ABA2-0BC069CD8E7F}" type="datetimeFigureOut">
               <a:rPr lang="en-US" smtClean="0"/>
-              <a:t>2/17/2018</a:t>
+              <a:t>4/5/2019</a:t>
             </a:fld>
             <a:endParaRPr lang="en-US"/>
           </a:p>
@@ -2278,7 +2278,7 @@
           <a:p>
             <a:fld id="{241EB5C9-1307-BA42-ABA2-0BC069CD8E7F}" type="datetimeFigureOut">
               <a:rPr lang="en-US" smtClean="0"/>
-              <a:t>2/17/2018</a:t>
+              <a:t>4/5/2019</a:t>
             </a:fld>
             <a:endParaRPr lang="en-US"/>
           </a:p>
@@ -2531,7 +2531,7 @@
           <a:p>
             <a:fld id="{241EB5C9-1307-BA42-ABA2-0BC069CD8E7F}" type="datetimeFigureOut">
               <a:rPr lang="en-US" smtClean="0"/>
-              <a:t>2/17/2018</a:t>
+              <a:t>4/5/2019</a:t>
             </a:fld>
             <a:endParaRPr lang="en-US"/>
           </a:p>
@@ -2744,7 +2744,7 @@
           <a:p>
             <a:fld id="{241EB5C9-1307-BA42-ABA2-0BC069CD8E7F}" type="datetimeFigureOut">
               <a:rPr lang="en-US" smtClean="0"/>
-              <a:t>2/17/2018</a:t>
+              <a:t>4/5/2019</a:t>
             </a:fld>
             <a:endParaRPr lang="en-US"/>
           </a:p>

</xml_diff>